<commit_message>
Update project and results
</commit_message>
<xml_diff>
--- a/Enhancing Mobile Security through Machine Learning_ A Study on Android Malware Detection.pptx
+++ b/Enhancing Mobile Security through Machine Learning_ A Study on Android Malware Detection.pptx
@@ -10233,7 +10233,7 @@
             </a:pPr>
             <a:r>
               <a:rPr lang="he-IL" sz="1400" dirty="0"/>
-              <a:t>אפשר לראות שהאלגוריתם השיג תוצאות פחות טובות מה</a:t>
+              <a:t>ניתן לראות שהאלגוריתם השיג תוצאות פחות טובות מה</a:t>
             </a:r>
             <a:r>
               <a:rPr lang="en-US" sz="1400" dirty="0"/>
@@ -10257,7 +10257,7 @@
             </a:r>
             <a:r>
               <a:rPr lang="he-IL" sz="1400" dirty="0"/>
-              <a:t> ניתן לראות בנוסף שקיבלנו</a:t>
+              <a:t> בנוסף ניתן לראות שקיבלנו</a:t>
             </a:r>
             <a:r>
               <a:rPr lang="en-US" sz="1400" dirty="0"/>
@@ -10295,7 +10295,10 @@
               <a:rPr lang="en-US" sz="1400" dirty="0"/>
               <a:t>benign</a:t>
             </a:r>
-            <a:endParaRPr lang="he-IL" sz="1400" dirty="0"/>
+            <a:r>
+              <a:rPr lang="he-IL" sz="1400" dirty="0"/>
+              <a:t>.</a:t>
+            </a:r>
           </a:p>
         </p:txBody>
       </p:sp>
@@ -11691,23 +11694,53 @@
                   <a:schemeClr val="bg1"/>
                 </a:solidFill>
               </a:rPr>
-              <a:t> למציאת פיצול אופטימלי בצמתי העץ במקום במדד האנטרופיה שנלמד בכיתה. כמו כן עומק העץ המקסימלי שנותן את התוצאות הטובות ביותר. ניתן לראות שהאלגוריתם נותן תוצאות דומות כמו </a:t>
-            </a:r>
-            <a:r>
+              <a:t> למציאת פיצול אופטימלי בצמתי העץ במקום במדד האנטרופיה שנלמד בכיתה. </a:t>
+            </a:r>
+            <a:br>
               <a:rPr lang="en-US" dirty="0">
                 <a:solidFill>
                   <a:schemeClr val="bg1"/>
                 </a:solidFill>
               </a:rPr>
-              <a:t>logistic regression  </a:t>
-            </a:r>
+            </a:br>
             <a:r>
               <a:rPr lang="he-IL" dirty="0">
                 <a:solidFill>
                   <a:schemeClr val="bg1"/>
                 </a:solidFill>
               </a:rPr>
-              <a:t>מבחינת המדדים הסטטיסטים.</a:t>
+              <a:t>כמו כן עומק העץ המקסימלי שנותן את התוצאות הטובות ביותר. </a:t>
+            </a:r>
+            <a:br>
+              <a:rPr lang="en-US" dirty="0">
+                <a:solidFill>
+                  <a:schemeClr val="bg1"/>
+                </a:solidFill>
+              </a:rPr>
+            </a:br>
+            <a:r>
+              <a:rPr lang="he-IL" dirty="0">
+                <a:solidFill>
+                  <a:schemeClr val="bg1"/>
+                </a:solidFill>
+              </a:rPr>
+              <a:t>ניתן לראות שהאלגוריתם נותן תוצאות דומות כמו </a:t>
+            </a:r>
+            <a:r>
+              <a:rPr lang="en-US" dirty="0">
+                <a:solidFill>
+                  <a:schemeClr val="bg1"/>
+                </a:solidFill>
+              </a:rPr>
+              <a:t>logistic regression</a:t>
+            </a:r>
+            <a:r>
+              <a:rPr lang="he-IL" dirty="0">
+                <a:solidFill>
+                  <a:schemeClr val="bg1"/>
+                </a:solidFill>
+              </a:rPr>
+              <a:t> מבחינת המדדים הסטטיסטים.</a:t>
             </a:r>
           </a:p>
         </p:txBody>
@@ -12071,7 +12104,7 @@
                 <a:ea typeface="Lato" panose="020F0502020204030203" pitchFamily="34" charset="0"/>
                 <a:cs typeface="+mj-cs"/>
               </a:rPr>
-              <a:t>למדנו שהאלגוריתם הזה עובד היטב עם נתונים לא מבניים כמו טקסט, תמונות </a:t>
+              <a:t>למדנו שאלגוריתם זה עובד היטב עם נתונים לא מבניים כמו טקסט, תמונות </a:t>
             </a:r>
             <a:r>
               <a:rPr lang="he-IL" sz="1600" dirty="0" err="1">
@@ -12098,23 +12131,7 @@
                 <a:ea typeface="Lato" panose="020F0502020204030203" pitchFamily="34" charset="0"/>
                 <a:cs typeface="+mj-cs"/>
               </a:rPr>
-              <a:t>לאחר חיפוש באינטרנט החלטנו להשתמש ב</a:t>
-            </a:r>
-            <a:r>
-              <a:rPr lang="en-US" sz="1600" dirty="0">
-                <a:latin typeface="Lato" panose="020F0502020204030203" pitchFamily="34" charset="0"/>
-                <a:ea typeface="Lato" panose="020F0502020204030203" pitchFamily="34" charset="0"/>
-                <a:cs typeface="Lato" panose="020F0502020204030203" pitchFamily="34" charset="0"/>
-              </a:rPr>
-              <a:t> </a:t>
-            </a:r>
-            <a:r>
-              <a:rPr lang="he-IL" sz="1600" dirty="0">
-                <a:latin typeface="Lato" panose="020F0502020204030203" pitchFamily="34" charset="0"/>
-                <a:ea typeface="Lato" panose="020F0502020204030203" pitchFamily="34" charset="0"/>
-                <a:cs typeface="+mj-cs"/>
-              </a:rPr>
-              <a:t> </a:t>
+              <a:t>לאחר חיפוש באינטרנט החלטנו להשתמש ב </a:t>
             </a:r>
             <a:r>
               <a:rPr lang="en-US" sz="1600" dirty="0">
@@ -12176,7 +12193,7 @@
                 <a:ea typeface="Lato" panose="020F0502020204030203" pitchFamily="34" charset="0"/>
                 <a:cs typeface="+mj-cs"/>
               </a:rPr>
-              <a:t>קראנו בנוסף שהסיכוי ל</a:t>
+              <a:t>קראנו בנוסף שהסיכוי ל-</a:t>
             </a:r>
             <a:r>
               <a:rPr lang="en-US" sz="1600" dirty="0">
@@ -12399,7 +12416,7 @@
         </p:spPr>
         <p:txBody>
           <a:bodyPr>
-            <a:normAutofit lnSpcReduction="10000"/>
+            <a:normAutofit/>
           </a:bodyPr>
           <a:lstStyle/>
           <a:p>
@@ -12462,18 +12479,12 @@
             </a:r>
             <a:r>
               <a:rPr lang="he-IL" sz="1400" dirty="0"/>
-              <a:t> , נעזרנו באינטרנט ובמדריכים שונים המסבירים כיצד להשתמש בספריית</a:t>
+              <a:t>, נעזרנו באינטרנט ובמדריכים שונים המסבירים כיצד להשתמש בספריית</a:t>
             </a:r>
             <a:r>
               <a:rPr lang="en-US" sz="1400" dirty="0"/>
               <a:t>Scikit-learn </a:t>
             </a:r>
-          </a:p>
-          <a:p>
-            <a:pPr marL="488950" indent="-342900" algn="r" rtl="1">
-              <a:buFont typeface="+mj-lt"/>
-              <a:buAutoNum type="arabicPeriod"/>
-            </a:pPr>
             <a:endParaRPr lang="he-IL" sz="1400" dirty="0"/>
           </a:p>
           <a:p>
@@ -12513,7 +12524,7 @@
             </a:r>
             <a:r>
               <a:rPr lang="en-US" sz="1400" dirty="0"/>
-              <a:t> data</a:t>
+              <a:t>data</a:t>
             </a:r>
             <a:r>
               <a:rPr lang="he-IL" sz="1400" dirty="0"/>
@@ -12541,7 +12552,7 @@
             </a:r>
             <a:r>
               <a:rPr lang="he-IL" sz="1400" dirty="0"/>
-              <a:t>)</a:t>
+              <a:t>).</a:t>
             </a:r>
           </a:p>
         </p:txBody>
@@ -12643,7 +12654,7 @@
             </a:pPr>
             <a:r>
               <a:rPr lang="he-IL" sz="1600" dirty="0"/>
-              <a:t>אובייקט הפיצ'רים עבור כל אפליקציה היה צריך להיות בפורמט אחיד עבור כלל האפליקציות מבחינת השדות שהיו בכל אובייקט(מילוי שדות חסרים בערך 0) .</a:t>
+              <a:t>אובייקט הפיצ'רים עבור כל אפליקציה היה צריך להיות בפורמט אחיד עבור כלל האפליקציות מבחינת השדות שהיו בכל אובייקט(מילוי שדות חסרים בערך 0).</a:t>
             </a:r>
           </a:p>
           <a:p>
@@ -12660,7 +12671,7 @@
             </a:pPr>
             <a:r>
               <a:rPr lang="he-IL" sz="1600" dirty="0"/>
-              <a:t>היו 22,383 פיצ'רים ולכן הזמן ריצה של האלגוריתמים הצריך מכונה חזקה והמון זמן עיבוד של המידע</a:t>
+              <a:t>היו 22,383 פיצ'רים ולכן הזמן ריצה של האלגוריתמים הצריך מכונה חזקה והמון זמן עיבוד של המידע.</a:t>
             </a:r>
             <a:br>
               <a:rPr lang="en-US" sz="1600" dirty="0"/>
@@ -12778,7 +12789,14 @@
             <a:pPr algn="r" rtl="1"/>
             <a:r>
               <a:rPr lang="he-IL" sz="1400" dirty="0"/>
-              <a:t>סינון המידע וצמצום כמות הפיצ'רים כך שהפיצ'רים שיופיעו יהיו פיצ'רים שייצגו בצורה הטובה ביותר את התכונות של כל אפליקציה ויהיו רלוונטיות לאלגוריתמי הלמידה. דבר זה יוביל לצמצום את זמני הריצה ואיכות הלמידה של האלגוריתמים. </a:t>
+              <a:t>סינון המידע וצמצום כמות הפיצ'רים כך שהפיצ'רים שיופיעו יהיו פיצ'רים שייצגו בצורה הטובה ביותר את התכונות של כל אפליקציה ויהיו רלוונטיות לאלגוריתמי הלמידה. </a:t>
+            </a:r>
+            <a:br>
+              <a:rPr lang="en-US" sz="1400" dirty="0"/>
+            </a:br>
+            <a:r>
+              <a:rPr lang="he-IL" sz="1400" dirty="0"/>
+              <a:t>דבר זה יוביל לצמצום את זמני הריצה ואיכות הלמידה של האלגוריתמים. </a:t>
             </a:r>
           </a:p>
           <a:p>
@@ -12800,7 +12818,7 @@
             </a:r>
             <a:r>
               <a:rPr lang="he-IL" sz="1400" dirty="0"/>
-              <a:t> לפי סוג התיוג. התוצאות שראינו העידו על כך שקיימים פיצ'רים שפחות רלוונטיים לתיוג האפליקציה. כמובן שניתן לבצע מחקר מעמיק יותר.</a:t>
+              <a:t> לפי סוג התיוג. התוצאות שראינו העידו על כך שקיימים פיצ'רים שפחות רלוונטיים לתיוג האפליקציה, כמובן שניתן לבצע מחקר מעמיק יותר.</a:t>
             </a:r>
           </a:p>
         </p:txBody>
@@ -13091,7 +13109,18 @@
               <a:rPr lang="he-IL" sz="1120" dirty="0">
                 <a:latin typeface="Lat\"/>
               </a:rPr>
-              <a:t>) כזדוניות או שפריות. השתמשנו במערך נתונים של 4591 אפליקציות והרצנו עליו מודלים שונים של למידת מכונה. </a:t>
+              <a:t>) כזדוניות או שפריות. </a:t>
+            </a:r>
+            <a:br>
+              <a:rPr lang="en-US" sz="1120" dirty="0">
+                <a:latin typeface="Lat\"/>
+              </a:rPr>
+            </a:br>
+            <a:r>
+              <a:rPr lang="he-IL" sz="1120" dirty="0">
+                <a:latin typeface="Lat\"/>
+              </a:rPr>
+              <a:t>השתמשנו במערך נתונים של 4591 אפליקציות והרצנו עליו מודלים שונים של למידת מכונה. </a:t>
             </a:r>
           </a:p>
           <a:p>
@@ -13104,19 +13133,7 @@
               <a:rPr lang="he-IL" sz="1120" dirty="0">
                 <a:latin typeface="Lat\"/>
               </a:rPr>
-              <a:t>בעיה זו תופסת תאוצה ותוספת נפח רחב בעולמות אבטחת המידע מכיוון שרוב חברות הטכנולוגיה מביאות פתרונות </a:t>
-            </a:r>
-            <a:r>
-              <a:rPr lang="he-IL" sz="1120" dirty="0" err="1">
-                <a:latin typeface="Lat\"/>
-              </a:rPr>
-              <a:t>וישומים</a:t>
-            </a:r>
-            <a:r>
-              <a:rPr lang="he-IL" sz="1120" dirty="0">
-                <a:latin typeface="Lat\"/>
-              </a:rPr>
-              <a:t> טכנולוגים למשתמשי קצה באמצעות אפליקציות ייעודיות למובייל ואתרים </a:t>
+              <a:t>בעיה זו תופסת תאוצה ותוספת נפח רחב בעולמות אבטחת המידע מכיוון שרוב חברות הטכנולוגיה מביאות פתרונות ויישומים טכנולוגים למשתמשי קצה באמצעות אפליקציות ייעודיות למובייל ואתרים </a:t>
             </a:r>
             <a:r>
               <a:rPr lang="he-IL" sz="1120" dirty="0" err="1">
@@ -13166,7 +13183,7 @@
               <a:rPr lang="he-IL" sz="1120" dirty="0">
                 <a:latin typeface="Lat\"/>
               </a:rPr>
-              <a:t> לכל אפליקציה מכילה 22,383 רשומות של פיצ'רים בינאריים כאשר 1 מייצג שהאפליקציה מכילה את הפיצ'ר הנתון, אחרת 0.</a:t>
+              <a:t> כל אפליקציה מכילה 22,383 רשומות של פיצ'רים בינאריים כאשר 1 מייצג שהאפליקציה מכילה את הפיצ'ר הנתון, אחרת 0.</a:t>
             </a:r>
           </a:p>
           <a:p>
@@ -13289,7 +13306,7 @@
         </p:spPr>
         <p:txBody>
           <a:bodyPr spcFirstLastPara="1" wrap="square" lIns="91425" tIns="91425" rIns="91425" bIns="91425" anchor="t" anchorCtr="0">
-            <a:normAutofit/>
+            <a:normAutofit lnSpcReduction="10000"/>
           </a:bodyPr>
           <a:lstStyle/>
           <a:p>
@@ -13302,7 +13319,18 @@
               <a:rPr lang="he-IL" sz="1120" dirty="0">
                 <a:latin typeface="Montserrat" pitchFamily="2" charset="77"/>
               </a:rPr>
-              <a:t>הרשומות של הפיצ'רים מחולקות ל10 קטגוריות שונות.  כל קטגוריה מכילה פיצ'רים בינאריים שמתארים תכונות שקיימות באפליקציה. הקטגוריות הן:</a:t>
+              <a:t>הרשומות של הפיצ'רים מחולקות ל10 קטגוריות שונות.  </a:t>
+            </a:r>
+            <a:br>
+              <a:rPr lang="en-US" sz="1120" dirty="0">
+                <a:latin typeface="Montserrat" pitchFamily="2" charset="77"/>
+              </a:rPr>
+            </a:br>
+            <a:r>
+              <a:rPr lang="he-IL" sz="1120" dirty="0">
+                <a:latin typeface="Montserrat" pitchFamily="2" charset="77"/>
+              </a:rPr>
+              <a:t>כל קטגוריה מכילה פיצ'רים בינאריים שמתארים תכונות שקיימות באפליקציה. הקטגוריות הן:</a:t>
             </a:r>
           </a:p>
           <a:p>
@@ -13621,8 +13649,8 @@
         </p:nvSpPr>
         <p:spPr>
           <a:xfrm>
-            <a:off x="314893" y="1872762"/>
-            <a:ext cx="8465769" cy="3189744"/>
+            <a:off x="314893" y="1455821"/>
+            <a:ext cx="8465769" cy="3606685"/>
           </a:xfrm>
           <a:prstGeom prst="rect">
             <a:avLst/>
@@ -13652,16 +13680,10 @@
               <a:t>- </a:t>
             </a:r>
             <a:r>
-              <a:rPr lang="he-IL" sz="1120" b="1" dirty="0">
-                <a:latin typeface="Montserrat" pitchFamily="2" charset="77"/>
-              </a:rPr>
-              <a:t> </a:t>
-            </a:r>
-            <a:r>
               <a:rPr lang="he-IL" sz="1120" dirty="0">
                 <a:latin typeface="Montserrat" pitchFamily="2" charset="77"/>
               </a:rPr>
-              <a:t>אלו הם המסכים או רכיבי ממשק המשתמש המרכיבים אפליקציה עבור משתמשי הקצה. לדוג': </a:t>
+              <a:t>הם המסכים או רכיבי ממשק המשתמש המרכיבים אפליקציה עבור משתמשי הקצה. לדוג': </a:t>
             </a:r>
             <a:endParaRPr lang="en-US" sz="1120" u="sng" dirty="0">
               <a:latin typeface="Montserrat" pitchFamily="2" charset="77"/>
@@ -13686,12 +13708,6 @@
               <a:t> </a:t>
             </a:r>
             <a:r>
-              <a:rPr lang="he-IL" sz="1120" u="sng" dirty="0">
-                <a:latin typeface="Montserrat" pitchFamily="2" charset="77"/>
-              </a:rPr>
-              <a:t> </a:t>
-            </a:r>
-            <a:r>
               <a:rPr lang="he-IL" sz="1120" dirty="0">
                 <a:latin typeface="Montserrat" pitchFamily="2" charset="77"/>
               </a:rPr>
@@ -13707,7 +13723,40 @@
               <a:rPr lang="he-IL" sz="1120" dirty="0">
                 <a:latin typeface="Montserrat" pitchFamily="2" charset="77"/>
               </a:rPr>
-              <a:t> והשירותים- שירותים הם תהליכי רקע שהאפליקציה יכולה להפעיל , וקלטים הם רכיבים שיכולים לקלוט שידורים מהמערכת או מאפליקציות אחרות. דוגמא לשירות: קביעת אירוע ביומן לפי שעה דרך </a:t>
+              <a:t> והשירותים.</a:t>
+            </a:r>
+            <a:br>
+              <a:rPr lang="en-US" sz="1120" dirty="0">
+                <a:latin typeface="Montserrat" pitchFamily="2" charset="77"/>
+              </a:rPr>
+            </a:br>
+            <a:r>
+              <a:rPr lang="he-IL" sz="1120" dirty="0">
+                <a:latin typeface="Montserrat" pitchFamily="2" charset="77"/>
+              </a:rPr>
+              <a:t>שירותים הם תהליכי רקע שהאפליקציה יכולה להפעיל. </a:t>
+            </a:r>
+            <a:br>
+              <a:rPr lang="en-US" sz="1120" dirty="0">
+                <a:latin typeface="Montserrat" pitchFamily="2" charset="77"/>
+              </a:rPr>
+            </a:br>
+            <a:r>
+              <a:rPr lang="he-IL" sz="1120" dirty="0">
+                <a:latin typeface="Montserrat" pitchFamily="2" charset="77"/>
+              </a:rPr>
+              <a:t>קלטים הם רכיבים שיכולים לקלוט שידורים מהמערכת או מאפליקציות אחרות. </a:t>
+            </a:r>
+            <a:br>
+              <a:rPr lang="en-US" sz="1120" dirty="0">
+                <a:latin typeface="Montserrat" pitchFamily="2" charset="77"/>
+              </a:rPr>
+            </a:br>
+            <a:r>
+              <a:rPr lang="he-IL" sz="1120" dirty="0">
+                <a:latin typeface="Montserrat" pitchFamily="2" charset="77"/>
+              </a:rPr>
+              <a:t>דוגמא לשירות: קביעת אירוע ביומן לפי שעה דרך </a:t>
             </a:r>
             <a:r>
               <a:rPr lang="he-IL" sz="1120" dirty="0" err="1">
@@ -13829,7 +13878,18 @@
               <a:rPr lang="he-IL" sz="1120" dirty="0">
                 <a:latin typeface="Montserrat" pitchFamily="2" charset="77"/>
               </a:rPr>
-              <a:t>) לדוג’: </a:t>
+              <a:t>) </a:t>
+            </a:r>
+            <a:br>
+              <a:rPr lang="en-US" sz="1120" dirty="0">
+                <a:latin typeface="Montserrat" pitchFamily="2" charset="77"/>
+              </a:rPr>
+            </a:br>
+            <a:r>
+              <a:rPr lang="he-IL" sz="1120" dirty="0">
+                <a:latin typeface="Montserrat" pitchFamily="2" charset="77"/>
+              </a:rPr>
+              <a:t>לדוג’: </a:t>
             </a:r>
             <a:r>
               <a:rPr lang="en-US" sz="1120" i="1" dirty="0">
@@ -13857,18 +13917,6 @@
               <a:rPr lang="en-US" sz="1120" b="1" dirty="0">
                 <a:latin typeface="Montserrat" pitchFamily="2" charset="77"/>
               </a:rPr>
-              <a:t>    </a:t>
-            </a:r>
-            <a:r>
-              <a:rPr lang="en-US" sz="1120" dirty="0">
-                <a:latin typeface="Montserrat" pitchFamily="2" charset="77"/>
-              </a:rPr>
-              <a:t> </a:t>
-            </a:r>
-            <a:r>
-              <a:rPr lang="en-US" sz="1120" b="1" dirty="0">
-                <a:latin typeface="Montserrat" pitchFamily="2" charset="77"/>
-              </a:rPr>
               <a:t>-</a:t>
             </a:r>
             <a:r>
@@ -13889,16 +13937,6 @@
               </a:rPr>
               <a:t>אלו הם המסכים או רכיבי ממשק המשתמש המרכיבים אפליקציה עבור משתמשי הקצה.</a:t>
             </a:r>
-          </a:p>
-          <a:p>
-            <a:pPr marL="171450" indent="-171450" algn="r" rtl="1">
-              <a:spcAft>
-                <a:spcPts val="1200"/>
-              </a:spcAft>
-            </a:pPr>
-            <a:endParaRPr lang="he-IL" sz="1120" dirty="0">
-              <a:latin typeface="Montserrat" pitchFamily="2" charset="77"/>
-            </a:endParaRPr>
           </a:p>
           <a:p>
             <a:pPr marL="171450" indent="-171450" algn="r" rtl="1">
@@ -14005,8 +14043,8 @@
         </p:nvSpPr>
         <p:spPr>
           <a:xfrm>
-            <a:off x="314893" y="1307850"/>
-            <a:ext cx="8465769" cy="3835650"/>
+            <a:off x="314893" y="1215189"/>
+            <a:ext cx="8465769" cy="3928311"/>
           </a:xfrm>
           <a:prstGeom prst="rect">
             <a:avLst/>
@@ -14027,7 +14065,7 @@
               <a:rPr lang="he-IL" sz="1120" dirty="0">
                 <a:latin typeface="Montserrat" pitchFamily="2" charset="77"/>
               </a:rPr>
-              <a:t>השלב הראשון היה להשיג מאגר מידע של אפליקציות זדוניות וידידותיות מהאינטרנט. חיפשנו בגוגל, מאגרי מידע ופרויקטים קיימים באינטרנט ולבסוף עשינו איחוד של כלל המידע שמצאנו ל-2 תיקיות, תיקייה אחת עבור אפליקציות זדוניות ותיקייה שניה עבור אפליקציות שפיריות.</a:t>
+              <a:t>השגת מאגר מידע של אפליקציות זדוניות וידידותיות מהאינטרנט. חיפשנו בגוגל, מאגרי מידע ופרויקטים קיימים באינטרנט ולבסוף עשינו איחוד של כלל המידע שמצאנו ל-2 תיקיות: תיקייה אחת עבור אפליקציות זדוניות ותיקייה שניה עבור אפליקציות שפיריות.</a:t>
             </a:r>
           </a:p>
           <a:p>
@@ -14040,7 +14078,7 @@
               <a:rPr lang="he-IL" sz="1120" dirty="0">
                 <a:latin typeface="Montserrat" pitchFamily="2" charset="77"/>
               </a:rPr>
-              <a:t>כתבנו סקריפט שרץ על 2 התיקיות לעיל ומשנה את שמות הקבצים כך שהשם של הקובץ של אפליקציה זדונית יכיל </a:t>
+              <a:t>כתיבת סקריפט שרץ על התיקיות הללו ומשנה את שמות הקבצים כך ששם הקובץ של אפליקציה זדונית יכיל </a:t>
             </a:r>
             <a:r>
               <a:rPr lang="en-US" sz="1120" dirty="0">
@@ -14052,7 +14090,7 @@
               <a:rPr lang="he-IL" sz="1120" dirty="0">
                 <a:latin typeface="Montserrat" pitchFamily="2" charset="77"/>
               </a:rPr>
-              <a:t> ועבור אפליקציה שפירית יתווסף "_</a:t>
+              <a:t> ועבור אפליקציה שפירית יכיל "_</a:t>
             </a:r>
             <a:r>
               <a:rPr lang="en-US" sz="1120" dirty="0">
@@ -14077,7 +14115,7 @@
               <a:rPr lang="he-IL" sz="1120" dirty="0">
                 <a:latin typeface="Montserrat" pitchFamily="2" charset="77"/>
               </a:rPr>
-              <a:t>בשלב השלישי העברנו את כל האפליקציות הקיימות לתיקייה אחת שתכיל את כלל האפליקציות לאחר שינויי השמות.</a:t>
+              <a:t>העברת כל האפליקציות הקיימות לתיקייה אחת שתכיל את כלל האפליקציות לאחר שינויי השמות.</a:t>
             </a:r>
           </a:p>
           <a:p>
@@ -14090,7 +14128,7 @@
               <a:rPr lang="he-IL" sz="1120" dirty="0">
                 <a:latin typeface="Montserrat" pitchFamily="2" charset="77"/>
               </a:rPr>
-              <a:t>רצנו על כל הקבצים בתיקייה: </a:t>
+              <a:t>ריצה על כל הקבצים בתיקייה: </a:t>
             </a:r>
             <a:br>
               <a:rPr lang="en-US" sz="1120" dirty="0">
@@ -14101,7 +14139,7 @@
               <a:rPr lang="he-IL" sz="1120" dirty="0">
                 <a:latin typeface="Montserrat" pitchFamily="2" charset="77"/>
               </a:rPr>
-              <a:t>עבור כל קובץ נבדוק האם השם שלו מכיל ייצוג עבור זדוני או לא, ע"פ הבדיקה הזו נדע לתת </a:t>
+              <a:t>עבור כל קובץ בדקנו האם השם שלו מכיל ייצוג עבור זדוני או לא, ע"פ הבדיקה הזו ידענו לתת </a:t>
             </a:r>
             <a:r>
               <a:rPr lang="en-US" sz="1120" dirty="0">
@@ -14445,7 +14483,7 @@
               <a:rPr lang="he-IL" sz="1400" dirty="0">
                 <a:latin typeface="Montserrat" pitchFamily="2" charset="77"/>
               </a:rPr>
-              <a:t>בדקנו את האלגוריתמים לפי שלש חלוקות שונות של </a:t>
+              <a:t>בדקנו את האלגוריתמים לפי שלוש חלוקות שונות של </a:t>
             </a:r>
             <a:r>
               <a:rPr lang="en-US" sz="1400" dirty="0">
@@ -14496,7 +14534,7 @@
                 <a:latin typeface="Lato" panose="020F0502020204030203" pitchFamily="34" charset="0"/>
                 <a:ea typeface="Lato" panose="020F0502020204030203" pitchFamily="34" charset="0"/>
               </a:rPr>
-              <a:t>לאחר הרצת כלל האלגוריתמים על כלל החלוקות והפרמטרים יצאנו את כלל התוצאות לקבצי</a:t>
+              <a:t>לאחר הרצת כלל האלגוריתמים על כלל החלוקות והפרמטרים ייצאנו את כלל התוצאות לקבצי </a:t>
             </a:r>
             <a:r>
               <a:rPr lang="en-US" sz="1400" dirty="0" err="1">
@@ -14511,7 +14549,20 @@
                 <a:latin typeface="Lato" panose="020F0502020204030203" pitchFamily="34" charset="0"/>
                 <a:ea typeface="Lato" panose="020F0502020204030203" pitchFamily="34" charset="0"/>
               </a:rPr>
-              <a:t> חיצוניים כאשר כל שם קובץ מייצג את האלגוריתם ואת החלוקה שבה הרצנו את האלגוריתם. כלומר, כל קובץ יכיל את ההרצה של האלגוריתם על כלל הערכים הרנדומליים של הפרמטרים לפי ייחס האימון והטסט. </a:t>
+              <a:t> חיצוניים כאשר כל שם קובץ מייצג את שם האלגוריתם ואת החלוקה שהביאה את התוצאות הללו. </a:t>
+            </a:r>
+            <a:br>
+              <a:rPr lang="en-US" sz="1400" dirty="0">
+                <a:latin typeface="Lato" panose="020F0502020204030203" pitchFamily="34" charset="0"/>
+                <a:ea typeface="Lato" panose="020F0502020204030203" pitchFamily="34" charset="0"/>
+              </a:rPr>
+            </a:br>
+            <a:r>
+              <a:rPr lang="he-IL" sz="1400" dirty="0">
+                <a:latin typeface="Lato" panose="020F0502020204030203" pitchFamily="34" charset="0"/>
+                <a:ea typeface="Lato" panose="020F0502020204030203" pitchFamily="34" charset="0"/>
+              </a:rPr>
+              <a:t>כלומר, כל קובץ יכיל את ההרצה של האלגוריתם על כלל הערכים הרנדומליים של הפרמטרים לפי ייחס האימון והטסט. </a:t>
             </a:r>
           </a:p>
           <a:p>
@@ -14734,7 +14785,18 @@
               <a:rPr lang="he-IL" sz="1400" dirty="0">
                 <a:latin typeface="Montserrat" pitchFamily="2" charset="77"/>
               </a:rPr>
-              <a:t> של הסיכון האמפירי וגם של הווקטור.  בנוסף קבענו</a:t>
+              <a:t> של הסיכון האמפירי וגם של הווקטור.  </a:t>
+            </a:r>
+            <a:br>
+              <a:rPr lang="en-US" sz="1400" dirty="0">
+                <a:latin typeface="Montserrat" pitchFamily="2" charset="77"/>
+              </a:rPr>
+            </a:br>
+            <a:r>
+              <a:rPr lang="he-IL" sz="1400" dirty="0">
+                <a:latin typeface="Montserrat" pitchFamily="2" charset="77"/>
+              </a:rPr>
+              <a:t>בנוסף, קבענו</a:t>
             </a:r>
             <a:r>
               <a:rPr lang="en-US" sz="1400" dirty="0">
@@ -15016,7 +15078,14 @@
             </a:r>
             <a:r>
               <a:rPr lang="he-IL" sz="1600" dirty="0"/>
-              <a:t>שונה. אפשר לראות שקיבלנו תוצאות יפות עבור אלגוריתם זה, וניתן לראות שלא קיים </a:t>
+              <a:t>שונה. </a:t>
+            </a:r>
+            <a:br>
+              <a:rPr lang="en-US" sz="1600" dirty="0"/>
+            </a:br>
+            <a:r>
+              <a:rPr lang="he-IL" sz="1600" dirty="0"/>
+              <a:t>אפשר לראות שקיבלנו תוצאות יפות עבור אלגוריתם זה, וניתן לראות שלא קיים </a:t>
             </a:r>
             <a:r>
               <a:rPr lang="en-US" sz="1600" dirty="0"/>

</xml_diff>